<commit_message>
Added Section 3 - Reward Model
feat:
added docx file with the corresponding section 3
added ppt file with the corresponding seciton 3
</commit_message>
<xml_diff>
--- a/section3/section3.pptx
+++ b/section3/section3.pptx
@@ -5,11 +5,16 @@
     <p:sldMasterId id="2147483648" r:id="rId1"/>
   </p:sldMasterIdLst>
   <p:notesMasterIdLst>
-    <p:notesMasterId r:id="rId4"/>
+    <p:notesMasterId r:id="rId9"/>
   </p:notesMasterIdLst>
   <p:sldIdLst>
     <p:sldId id="256" r:id="rId2"/>
     <p:sldId id="257" r:id="rId3"/>
+    <p:sldId id="258" r:id="rId4"/>
+    <p:sldId id="259" r:id="rId5"/>
+    <p:sldId id="260" r:id="rId6"/>
+    <p:sldId id="261" r:id="rId7"/>
+    <p:sldId id="262" r:id="rId8"/>
   </p:sldIdLst>
   <p:sldSz cx="12192000" cy="6858000"/>
   <p:notesSz cx="6858000" cy="9144000"/>
@@ -198,7 +203,7 @@
           <a:p>
             <a:fld id="{5549AB31-C21E-4C3B-B1A0-0CB868F832B2}" type="datetimeFigureOut">
               <a:rPr lang="en-US" smtClean="0"/>
-              <a:t>2025-10-25</a:t>
+              <a:t>10/25/2025</a:t>
             </a:fld>
             <a:endParaRPr lang="en-US"/>
           </a:p>
@@ -612,7 +617,7 @@
           <a:p>
             <a:fld id="{3365F9F5-D4B5-4EB9-A01F-29DBFF511CA8}" type="datetimeFigureOut">
               <a:rPr lang="en-US" smtClean="0"/>
-              <a:t>2025-10-25</a:t>
+              <a:t>10/25/2025</a:t>
             </a:fld>
             <a:endParaRPr lang="en-US"/>
           </a:p>
@@ -810,7 +815,7 @@
           <a:p>
             <a:fld id="{3365F9F5-D4B5-4EB9-A01F-29DBFF511CA8}" type="datetimeFigureOut">
               <a:rPr lang="en-US" smtClean="0"/>
-              <a:t>2025-10-25</a:t>
+              <a:t>10/25/2025</a:t>
             </a:fld>
             <a:endParaRPr lang="en-US"/>
           </a:p>
@@ -1018,7 +1023,7 @@
           <a:p>
             <a:fld id="{3365F9F5-D4B5-4EB9-A01F-29DBFF511CA8}" type="datetimeFigureOut">
               <a:rPr lang="en-US" smtClean="0"/>
-              <a:t>2025-10-25</a:t>
+              <a:t>10/25/2025</a:t>
             </a:fld>
             <a:endParaRPr lang="en-US"/>
           </a:p>
@@ -1216,7 +1221,7 @@
           <a:p>
             <a:fld id="{3365F9F5-D4B5-4EB9-A01F-29DBFF511CA8}" type="datetimeFigureOut">
               <a:rPr lang="en-US" smtClean="0"/>
-              <a:t>2025-10-25</a:t>
+              <a:t>10/25/2025</a:t>
             </a:fld>
             <a:endParaRPr lang="en-US"/>
           </a:p>
@@ -1491,7 +1496,7 @@
           <a:p>
             <a:fld id="{3365F9F5-D4B5-4EB9-A01F-29DBFF511CA8}" type="datetimeFigureOut">
               <a:rPr lang="en-US" smtClean="0"/>
-              <a:t>2025-10-25</a:t>
+              <a:t>10/25/2025</a:t>
             </a:fld>
             <a:endParaRPr lang="en-US"/>
           </a:p>
@@ -1756,7 +1761,7 @@
           <a:p>
             <a:fld id="{3365F9F5-D4B5-4EB9-A01F-29DBFF511CA8}" type="datetimeFigureOut">
               <a:rPr lang="en-US" smtClean="0"/>
-              <a:t>2025-10-25</a:t>
+              <a:t>10/25/2025</a:t>
             </a:fld>
             <a:endParaRPr lang="en-US"/>
           </a:p>
@@ -2168,7 +2173,7 @@
           <a:p>
             <a:fld id="{3365F9F5-D4B5-4EB9-A01F-29DBFF511CA8}" type="datetimeFigureOut">
               <a:rPr lang="en-US" smtClean="0"/>
-              <a:t>2025-10-25</a:t>
+              <a:t>10/25/2025</a:t>
             </a:fld>
             <a:endParaRPr lang="en-US"/>
           </a:p>
@@ -2309,7 +2314,7 @@
           <a:p>
             <a:fld id="{3365F9F5-D4B5-4EB9-A01F-29DBFF511CA8}" type="datetimeFigureOut">
               <a:rPr lang="en-US" smtClean="0"/>
-              <a:t>2025-10-25</a:t>
+              <a:t>10/25/2025</a:t>
             </a:fld>
             <a:endParaRPr lang="en-US"/>
           </a:p>
@@ -2422,7 +2427,7 @@
           <a:p>
             <a:fld id="{3365F9F5-D4B5-4EB9-A01F-29DBFF511CA8}" type="datetimeFigureOut">
               <a:rPr lang="en-US" smtClean="0"/>
-              <a:t>2025-10-25</a:t>
+              <a:t>10/25/2025</a:t>
             </a:fld>
             <a:endParaRPr lang="en-US"/>
           </a:p>
@@ -2733,7 +2738,7 @@
           <a:p>
             <a:fld id="{3365F9F5-D4B5-4EB9-A01F-29DBFF511CA8}" type="datetimeFigureOut">
               <a:rPr lang="en-US" smtClean="0"/>
-              <a:t>2025-10-25</a:t>
+              <a:t>10/25/2025</a:t>
             </a:fld>
             <a:endParaRPr lang="en-US"/>
           </a:p>
@@ -3021,7 +3026,7 @@
           <a:p>
             <a:fld id="{3365F9F5-D4B5-4EB9-A01F-29DBFF511CA8}" type="datetimeFigureOut">
               <a:rPr lang="en-US" smtClean="0"/>
-              <a:t>2025-10-25</a:t>
+              <a:t>10/25/2025</a:t>
             </a:fld>
             <a:endParaRPr lang="en-US"/>
           </a:p>
@@ -3262,7 +3267,7 @@
           <a:p>
             <a:fld id="{3365F9F5-D4B5-4EB9-A01F-29DBFF511CA8}" type="datetimeFigureOut">
               <a:rPr lang="en-US" smtClean="0"/>
-              <a:t>2025-10-25</a:t>
+              <a:t>10/25/2025</a:t>
             </a:fld>
             <a:endParaRPr lang="en-US"/>
           </a:p>
@@ -3803,11 +3808,12 @@
           <a:lstStyle/>
           <a:p>
             <a:r>
-              <a:rPr lang="en-US" dirty="0">
-                <a:latin typeface="Abadi" panose="020B0604020104020204" pitchFamily="34" charset="0"/>
-              </a:rPr>
-              <a:t>Title</a:t>
-            </a:r>
+              <a:rPr lang="en-US" dirty="0"/>
+              <a:t>Reward Model (RM) Training via Ranking</a:t>
+            </a:r>
+            <a:endParaRPr lang="en-US" dirty="0">
+              <a:latin typeface="Abadi" panose="020B0604020104020204" pitchFamily="34" charset="0"/>
+            </a:endParaRPr>
           </a:p>
         </p:txBody>
       </p:sp>
@@ -3846,11 +3852,232 @@
               <a:buNone/>
             </a:pPr>
             <a:r>
+              <a:rPr lang="en-US" b="1" dirty="0">
+                <a:latin typeface="Abadi" panose="020B0604020104020204" pitchFamily="34" charset="0"/>
+              </a:rPr>
+              <a:t>Goal: </a:t>
+            </a:r>
+            <a:r>
               <a:rPr lang="en-US" dirty="0">
                 <a:latin typeface="Abadi" panose="020B0604020104020204" pitchFamily="34" charset="0"/>
               </a:rPr>
-              <a:t>Content</a:t>
-            </a:r>
+              <a:t>Create a model capable of predicting which outputs humans prefer.</a:t>
+            </a:r>
+          </a:p>
+          <a:p>
+            <a:pPr marL="0" indent="0">
+              <a:lnSpc>
+                <a:spcPct val="110000"/>
+              </a:lnSpc>
+              <a:buNone/>
+            </a:pPr>
+            <a:r>
+              <a:rPr lang="en-US" b="1" dirty="0">
+                <a:latin typeface="Abadi" panose="020B0604020104020204" pitchFamily="34" charset="0"/>
+              </a:rPr>
+              <a:t>Process:</a:t>
+            </a:r>
+          </a:p>
+          <a:p>
+            <a:pPr>
+              <a:lnSpc>
+                <a:spcPct val="110000"/>
+              </a:lnSpc>
+            </a:pPr>
+            <a:r>
+              <a:rPr lang="en-US" dirty="0">
+                <a:latin typeface="Abadi" panose="020B0604020104020204" pitchFamily="34" charset="0"/>
+              </a:rPr>
+              <a:t>Human labelers rank several model responses (1=worst </a:t>
+            </a:r>
+            <a:r>
+              <a:rPr lang="pt-PT" dirty="0"/>
+              <a:t>→ 7=</a:t>
+            </a:r>
+            <a:r>
+              <a:rPr lang="pt-PT" dirty="0" err="1"/>
+              <a:t>best</a:t>
+            </a:r>
+            <a:r>
+              <a:rPr lang="pt-PT" dirty="0"/>
+              <a:t>)</a:t>
+            </a:r>
+          </a:p>
+          <a:p>
+            <a:pPr>
+              <a:lnSpc>
+                <a:spcPct val="110000"/>
+              </a:lnSpc>
+            </a:pPr>
+            <a:r>
+              <a:rPr lang="pt-PT" dirty="0">
+                <a:latin typeface="Abadi" panose="020B0604020104020204" pitchFamily="34" charset="0"/>
+              </a:rPr>
+              <a:t>Rankings are </a:t>
+            </a:r>
+            <a:r>
+              <a:rPr lang="pt-PT" dirty="0" err="1">
+                <a:latin typeface="Abadi" panose="020B0604020104020204" pitchFamily="34" charset="0"/>
+              </a:rPr>
+              <a:t>converted</a:t>
+            </a:r>
+            <a:r>
+              <a:rPr lang="pt-PT" dirty="0">
+                <a:latin typeface="Abadi" panose="020B0604020104020204" pitchFamily="34" charset="0"/>
+              </a:rPr>
+              <a:t> </a:t>
+            </a:r>
+            <a:r>
+              <a:rPr lang="pt-PT" dirty="0" err="1">
+                <a:latin typeface="Abadi" panose="020B0604020104020204" pitchFamily="34" charset="0"/>
+              </a:rPr>
+              <a:t>into</a:t>
+            </a:r>
+            <a:r>
+              <a:rPr lang="pt-PT" dirty="0">
+                <a:latin typeface="Abadi" panose="020B0604020104020204" pitchFamily="34" charset="0"/>
+              </a:rPr>
+              <a:t> a </a:t>
+            </a:r>
+            <a:r>
+              <a:rPr lang="pt-PT" dirty="0" err="1">
+                <a:latin typeface="Abadi" panose="020B0604020104020204" pitchFamily="34" charset="0"/>
+              </a:rPr>
+              <a:t>Reward</a:t>
+            </a:r>
+            <a:r>
+              <a:rPr lang="pt-PT" dirty="0">
+                <a:latin typeface="Abadi" panose="020B0604020104020204" pitchFamily="34" charset="0"/>
+              </a:rPr>
+              <a:t> </a:t>
+            </a:r>
+            <a:r>
+              <a:rPr lang="pt-PT" dirty="0" err="1">
+                <a:latin typeface="Abadi" panose="020B0604020104020204" pitchFamily="34" charset="0"/>
+              </a:rPr>
+              <a:t>Model</a:t>
+            </a:r>
+            <a:r>
+              <a:rPr lang="pt-PT" dirty="0">
+                <a:latin typeface="Abadi" panose="020B0604020104020204" pitchFamily="34" charset="0"/>
+              </a:rPr>
+              <a:t> (RM)</a:t>
+            </a:r>
+          </a:p>
+          <a:p>
+            <a:pPr>
+              <a:lnSpc>
+                <a:spcPct val="110000"/>
+              </a:lnSpc>
+            </a:pPr>
+            <a:r>
+              <a:rPr lang="pt-PT" dirty="0">
+                <a:latin typeface="Abadi" panose="020B0604020104020204" pitchFamily="34" charset="0"/>
+              </a:rPr>
+              <a:t>RM </a:t>
+            </a:r>
+            <a:r>
+              <a:rPr lang="pt-PT" dirty="0" err="1">
+                <a:latin typeface="Abadi" panose="020B0604020104020204" pitchFamily="34" charset="0"/>
+              </a:rPr>
+              <a:t>predicts</a:t>
+            </a:r>
+            <a:r>
+              <a:rPr lang="pt-PT" dirty="0">
+                <a:latin typeface="Abadi" panose="020B0604020104020204" pitchFamily="34" charset="0"/>
+              </a:rPr>
+              <a:t> a </a:t>
+            </a:r>
+            <a:r>
+              <a:rPr lang="pt-PT" dirty="0" err="1">
+                <a:latin typeface="Abadi" panose="020B0604020104020204" pitchFamily="34" charset="0"/>
+              </a:rPr>
+              <a:t>numerical</a:t>
+            </a:r>
+            <a:r>
+              <a:rPr lang="pt-PT" dirty="0">
+                <a:latin typeface="Abadi" panose="020B0604020104020204" pitchFamily="34" charset="0"/>
+              </a:rPr>
+              <a:t> “</a:t>
+            </a:r>
+            <a:r>
+              <a:rPr lang="pt-PT" dirty="0" err="1">
+                <a:latin typeface="Abadi" panose="020B0604020104020204" pitchFamily="34" charset="0"/>
+              </a:rPr>
+              <a:t>reward</a:t>
+            </a:r>
+            <a:r>
+              <a:rPr lang="pt-PT" dirty="0">
+                <a:latin typeface="Abadi" panose="020B0604020104020204" pitchFamily="34" charset="0"/>
+              </a:rPr>
+              <a:t>” for </a:t>
+            </a:r>
+            <a:r>
+              <a:rPr lang="pt-PT" dirty="0" err="1">
+                <a:latin typeface="Abadi" panose="020B0604020104020204" pitchFamily="34" charset="0"/>
+              </a:rPr>
+              <a:t>each</a:t>
+            </a:r>
+            <a:r>
+              <a:rPr lang="pt-PT" dirty="0">
+                <a:latin typeface="Abadi" panose="020B0604020104020204" pitchFamily="34" charset="0"/>
+              </a:rPr>
+              <a:t> output</a:t>
+            </a:r>
+          </a:p>
+          <a:p>
+            <a:pPr marL="0" indent="0">
+              <a:lnSpc>
+                <a:spcPct val="110000"/>
+              </a:lnSpc>
+              <a:buNone/>
+            </a:pPr>
+            <a:r>
+              <a:rPr lang="en-US" b="1" dirty="0">
+                <a:latin typeface="Abadi" panose="020B0604020104020204" pitchFamily="34" charset="0"/>
+              </a:rPr>
+              <a:t>Training Process:</a:t>
+            </a:r>
+            <a:endParaRPr lang="en-US" dirty="0">
+              <a:latin typeface="Abadi" panose="020B0604020104020204" pitchFamily="34" charset="0"/>
+            </a:endParaRPr>
+          </a:p>
+          <a:p>
+            <a:pPr>
+              <a:lnSpc>
+                <a:spcPct val="110000"/>
+              </a:lnSpc>
+            </a:pPr>
+            <a:r>
+              <a:rPr lang="en-US" dirty="0">
+                <a:latin typeface="Abadi" panose="020B0604020104020204" pitchFamily="34" charset="0"/>
+              </a:rPr>
+              <a:t>The SFT model generates multiple answers for the same prompt</a:t>
+            </a:r>
+          </a:p>
+          <a:p>
+            <a:pPr>
+              <a:lnSpc>
+                <a:spcPct val="110000"/>
+              </a:lnSpc>
+            </a:pPr>
+            <a:r>
+              <a:rPr lang="en-US" dirty="0">
+                <a:latin typeface="Abadi" panose="020B0604020104020204" pitchFamily="34" charset="0"/>
+              </a:rPr>
+              <a:t>RM learns to give higher rewards to preferred outputs</a:t>
+            </a:r>
+          </a:p>
+          <a:p>
+            <a:pPr marL="0" indent="0">
+              <a:lnSpc>
+                <a:spcPct val="110000"/>
+              </a:lnSpc>
+              <a:buNone/>
+            </a:pPr>
+            <a:endParaRPr lang="en-US" dirty="0">
+              <a:latin typeface="Abadi" panose="020B0604020104020204" pitchFamily="34" charset="0"/>
+            </a:endParaRPr>
           </a:p>
         </p:txBody>
       </p:sp>
@@ -3858,6 +4085,2202 @@
     <p:extLst>
       <p:ext uri="{BB962C8B-B14F-4D97-AF65-F5344CB8AC3E}">
         <p14:creationId xmlns:p14="http://schemas.microsoft.com/office/powerpoint/2010/main" val="444257243"/>
+      </p:ext>
+    </p:extLst>
+  </p:cSld>
+  <p:clrMapOvr>
+    <a:masterClrMapping/>
+  </p:clrMapOvr>
+</p:sld>
+</file>
+
+<file path=ppt/slides/slide3.xml><?xml version="1.0" encoding="utf-8"?>
+<p:sld xmlns:a="http://schemas.openxmlformats.org/drawingml/2006/main" xmlns:r="http://schemas.openxmlformats.org/officeDocument/2006/relationships" xmlns:p="http://schemas.openxmlformats.org/presentationml/2006/main">
+  <p:cSld>
+    <p:spTree>
+      <p:nvGrpSpPr>
+        <p:cNvPr id="1" name="">
+          <a:extLst>
+            <a:ext uri="{FF2B5EF4-FFF2-40B4-BE49-F238E27FC236}">
+              <a16:creationId xmlns:a16="http://schemas.microsoft.com/office/drawing/2014/main" id="{B9451A43-5FFA-5E97-825D-B860619FDB87}"/>
+            </a:ext>
+          </a:extLst>
+        </p:cNvPr>
+        <p:cNvGrpSpPr/>
+        <p:nvPr/>
+      </p:nvGrpSpPr>
+      <p:grpSpPr>
+        <a:xfrm>
+          <a:off x="0" y="0"/>
+          <a:ext cx="0" cy="0"/>
+          <a:chOff x="0" y="0"/>
+          <a:chExt cx="0" cy="0"/>
+        </a:xfrm>
+      </p:grpSpPr>
+      <p:sp>
+        <p:nvSpPr>
+          <p:cNvPr id="2" name="Title 1">
+            <a:extLst>
+              <a:ext uri="{FF2B5EF4-FFF2-40B4-BE49-F238E27FC236}">
+                <a16:creationId xmlns:a16="http://schemas.microsoft.com/office/drawing/2014/main" id="{371FADD9-6C84-FA0C-A29E-99E117BE34E6}"/>
+              </a:ext>
+            </a:extLst>
+          </p:cNvPr>
+          <p:cNvSpPr>
+            <a:spLocks noGrp="1"/>
+          </p:cNvSpPr>
+          <p:nvPr>
+            <p:ph type="title"/>
+          </p:nvPr>
+        </p:nvSpPr>
+        <p:spPr>
+          <a:xfrm>
+            <a:off x="532149" y="365125"/>
+            <a:ext cx="11407515" cy="849078"/>
+          </a:xfrm>
+        </p:spPr>
+        <p:txBody>
+          <a:bodyPr>
+            <a:normAutofit/>
+          </a:bodyPr>
+          <a:lstStyle/>
+          <a:p>
+            <a:r>
+              <a:rPr lang="en-US" dirty="0"/>
+              <a:t>The Reward Model Loss Function</a:t>
+            </a:r>
+            <a:endParaRPr lang="en-US" dirty="0">
+              <a:latin typeface="Abadi" panose="020B0604020104020204" pitchFamily="34" charset="0"/>
+            </a:endParaRPr>
+          </a:p>
+        </p:txBody>
+      </p:sp>
+      <mc:AlternateContent xmlns:mc="http://schemas.openxmlformats.org/markup-compatibility/2006">
+        <mc:Choice xmlns:a14="http://schemas.microsoft.com/office/drawing/2010/main" Requires="a14">
+          <p:sp>
+            <p:nvSpPr>
+              <p:cNvPr id="3" name="Content Placeholder 2">
+                <a:extLst>
+                  <a:ext uri="{FF2B5EF4-FFF2-40B4-BE49-F238E27FC236}">
+                    <a16:creationId xmlns:a16="http://schemas.microsoft.com/office/drawing/2014/main" id="{02769172-6863-6D57-F88A-AD5DD5255A8A}"/>
+                  </a:ext>
+                </a:extLst>
+              </p:cNvPr>
+              <p:cNvSpPr>
+                <a:spLocks noGrp="1"/>
+              </p:cNvSpPr>
+              <p:nvPr>
+                <p:ph idx="1"/>
+              </p:nvPr>
+            </p:nvSpPr>
+            <p:spPr>
+              <a:xfrm>
+                <a:off x="532151" y="1491521"/>
+                <a:ext cx="11407515" cy="4991726"/>
+              </a:xfrm>
+            </p:spPr>
+            <p:txBody>
+              <a:bodyPr>
+                <a:normAutofit fontScale="85000" lnSpcReduction="20000"/>
+              </a:bodyPr>
+              <a:lstStyle/>
+              <a:p>
+                <a:pPr marL="0" indent="0">
+                  <a:lnSpc>
+                    <a:spcPct val="110000"/>
+                  </a:lnSpc>
+                  <a:buNone/>
+                </a:pPr>
+                <a:r>
+                  <a:rPr lang="en-US" dirty="0"/>
+                  <a:t>Loss Function:</a:t>
+                </a:r>
+              </a:p>
+              <a:p>
+                <a:pPr marL="0" indent="0">
+                  <a:lnSpc>
+                    <a:spcPct val="110000"/>
+                  </a:lnSpc>
+                  <a:buNone/>
+                </a:pPr>
+                <a:endParaRPr lang="en-US" dirty="0"/>
+              </a:p>
+              <a:p>
+                <a:pPr marL="0" indent="0">
+                  <a:lnSpc>
+                    <a:spcPct val="110000"/>
+                  </a:lnSpc>
+                  <a:buNone/>
+                </a:pPr>
+                <a14:m>
+                  <m:oMathPara xmlns:m="http://schemas.openxmlformats.org/officeDocument/2006/math">
+                    <m:oMathParaPr>
+                      <m:jc m:val="centerGroup"/>
+                    </m:oMathParaPr>
+                    <m:oMath xmlns:m="http://schemas.openxmlformats.org/officeDocument/2006/math">
+                      <m:r>
+                        <a:rPr lang="en-US" i="1"/>
+                        <m:t>𝑙𝑜𝑠𝑠</m:t>
+                      </m:r>
+                      <m:r>
+                        <a:rPr lang="en-US" i="1"/>
+                        <m:t>(</m:t>
+                      </m:r>
+                      <m:r>
+                        <a:rPr lang="en-US" i="1"/>
+                        <m:t>𝜃</m:t>
+                      </m:r>
+                      <m:r>
+                        <a:rPr lang="en-US" i="1"/>
+                        <m:t>)= −</m:t>
+                      </m:r>
+                      <m:sSub>
+                        <m:sSubPr>
+                          <m:ctrlPr>
+                            <a:rPr lang="pt-PT" i="1"/>
+                          </m:ctrlPr>
+                        </m:sSubPr>
+                        <m:e>
+                          <m:r>
+                            <m:rPr>
+                              <m:sty m:val="p"/>
+                            </m:rPr>
+                            <a:rPr lang="en-US"/>
+                            <m:t>Ε</m:t>
+                          </m:r>
+                        </m:e>
+                        <m:sub>
+                          <m:d>
+                            <m:dPr>
+                              <m:ctrlPr>
+                                <a:rPr lang="pt-PT" i="1"/>
+                              </m:ctrlPr>
+                            </m:dPr>
+                            <m:e>
+                              <m:r>
+                                <a:rPr lang="en-US" i="1"/>
+                                <m:t>𝑥</m:t>
+                              </m:r>
+                              <m:r>
+                                <a:rPr lang="en-US" i="1"/>
+                                <m:t>,</m:t>
+                              </m:r>
+                              <m:sSub>
+                                <m:sSubPr>
+                                  <m:ctrlPr>
+                                    <a:rPr lang="pt-PT" i="1"/>
+                                  </m:ctrlPr>
+                                </m:sSubPr>
+                                <m:e>
+                                  <m:r>
+                                    <a:rPr lang="en-US" i="1"/>
+                                    <m:t>𝑦</m:t>
+                                  </m:r>
+                                </m:e>
+                                <m:sub>
+                                  <m:r>
+                                    <a:rPr lang="en-US" i="1"/>
+                                    <m:t>𝑤</m:t>
+                                  </m:r>
+                                </m:sub>
+                              </m:sSub>
+                              <m:r>
+                                <a:rPr lang="en-US" i="1"/>
+                                <m:t>,</m:t>
+                              </m:r>
+                              <m:sSub>
+                                <m:sSubPr>
+                                  <m:ctrlPr>
+                                    <a:rPr lang="pt-PT" i="1"/>
+                                  </m:ctrlPr>
+                                </m:sSubPr>
+                                <m:e>
+                                  <m:r>
+                                    <a:rPr lang="en-US" i="1"/>
+                                    <m:t>𝑦</m:t>
+                                  </m:r>
+                                </m:e>
+                                <m:sub>
+                                  <m:r>
+                                    <a:rPr lang="en-US" i="1"/>
+                                    <m:t>𝑙</m:t>
+                                  </m:r>
+                                </m:sub>
+                              </m:sSub>
+                            </m:e>
+                          </m:d>
+                        </m:sub>
+                      </m:sSub>
+                      <m:r>
+                        <a:rPr lang="en-US" i="1"/>
+                        <m:t>[</m:t>
+                      </m:r>
+                      <m:func>
+                        <m:funcPr>
+                          <m:ctrlPr>
+                            <a:rPr lang="pt-PT" i="1"/>
+                          </m:ctrlPr>
+                        </m:funcPr>
+                        <m:fName>
+                          <m:r>
+                            <m:rPr>
+                              <m:sty m:val="p"/>
+                            </m:rPr>
+                            <a:rPr lang="en-US"/>
+                            <m:t>log</m:t>
+                          </m:r>
+                        </m:fName>
+                        <m:e>
+                          <m:d>
+                            <m:dPr>
+                              <m:ctrlPr>
+                                <a:rPr lang="pt-PT" i="1"/>
+                              </m:ctrlPr>
+                            </m:dPr>
+                            <m:e>
+                              <m:r>
+                                <a:rPr lang="en-US" i="1"/>
+                                <m:t>𝜎</m:t>
+                              </m:r>
+                              <m:d>
+                                <m:dPr>
+                                  <m:ctrlPr>
+                                    <a:rPr lang="pt-PT" i="1"/>
+                                  </m:ctrlPr>
+                                </m:dPr>
+                                <m:e>
+                                  <m:sSub>
+                                    <m:sSubPr>
+                                      <m:ctrlPr>
+                                        <a:rPr lang="pt-PT" i="1"/>
+                                      </m:ctrlPr>
+                                    </m:sSubPr>
+                                    <m:e>
+                                      <m:r>
+                                        <a:rPr lang="en-US" i="1"/>
+                                        <m:t>𝑟</m:t>
+                                      </m:r>
+                                    </m:e>
+                                    <m:sub>
+                                      <m:r>
+                                        <a:rPr lang="en-US" i="1"/>
+                                        <m:t>𝜃</m:t>
+                                      </m:r>
+                                    </m:sub>
+                                  </m:sSub>
+                                  <m:d>
+                                    <m:dPr>
+                                      <m:ctrlPr>
+                                        <a:rPr lang="pt-PT" i="1"/>
+                                      </m:ctrlPr>
+                                    </m:dPr>
+                                    <m:e>
+                                      <m:r>
+                                        <a:rPr lang="en-US" i="1"/>
+                                        <m:t>𝑥</m:t>
+                                      </m:r>
+                                      <m:r>
+                                        <a:rPr lang="en-US" i="1"/>
+                                        <m:t>,</m:t>
+                                      </m:r>
+                                      <m:sSub>
+                                        <m:sSubPr>
+                                          <m:ctrlPr>
+                                            <a:rPr lang="pt-PT" i="1"/>
+                                          </m:ctrlPr>
+                                        </m:sSubPr>
+                                        <m:e>
+                                          <m:r>
+                                            <a:rPr lang="en-US" i="1"/>
+                                            <m:t>𝑦</m:t>
+                                          </m:r>
+                                        </m:e>
+                                        <m:sub>
+                                          <m:r>
+                                            <a:rPr lang="en-US" i="1"/>
+                                            <m:t>𝑤</m:t>
+                                          </m:r>
+                                        </m:sub>
+                                      </m:sSub>
+                                    </m:e>
+                                  </m:d>
+                                  <m:r>
+                                    <a:rPr lang="en-US" i="1"/>
+                                    <m:t>−</m:t>
+                                  </m:r>
+                                  <m:sSub>
+                                    <m:sSubPr>
+                                      <m:ctrlPr>
+                                        <a:rPr lang="pt-PT" i="1"/>
+                                      </m:ctrlPr>
+                                    </m:sSubPr>
+                                    <m:e>
+                                      <m:r>
+                                        <a:rPr lang="en-US" i="1"/>
+                                        <m:t>𝑟</m:t>
+                                      </m:r>
+                                    </m:e>
+                                    <m:sub>
+                                      <m:r>
+                                        <a:rPr lang="en-US" i="1"/>
+                                        <m:t>𝜃</m:t>
+                                      </m:r>
+                                    </m:sub>
+                                  </m:sSub>
+                                  <m:d>
+                                    <m:dPr>
+                                      <m:ctrlPr>
+                                        <a:rPr lang="pt-PT" i="1"/>
+                                      </m:ctrlPr>
+                                    </m:dPr>
+                                    <m:e>
+                                      <m:r>
+                                        <a:rPr lang="en-US" i="1"/>
+                                        <m:t>𝑥</m:t>
+                                      </m:r>
+                                      <m:r>
+                                        <a:rPr lang="en-US" i="1"/>
+                                        <m:t>,</m:t>
+                                      </m:r>
+                                      <m:sSub>
+                                        <m:sSubPr>
+                                          <m:ctrlPr>
+                                            <a:rPr lang="pt-PT" i="1"/>
+                                          </m:ctrlPr>
+                                        </m:sSubPr>
+                                        <m:e>
+                                          <m:r>
+                                            <a:rPr lang="en-US" i="1"/>
+                                            <m:t>𝑦</m:t>
+                                          </m:r>
+                                        </m:e>
+                                        <m:sub>
+                                          <m:r>
+                                            <a:rPr lang="en-US" i="1"/>
+                                            <m:t>𝑙</m:t>
+                                          </m:r>
+                                        </m:sub>
+                                      </m:sSub>
+                                    </m:e>
+                                  </m:d>
+                                </m:e>
+                              </m:d>
+                            </m:e>
+                          </m:d>
+                        </m:e>
+                      </m:func>
+                      <m:r>
+                        <a:rPr lang="en-US" i="1"/>
+                        <m:t>]</m:t>
+                      </m:r>
+                    </m:oMath>
+                  </m:oMathPara>
+                </a14:m>
+                <a:endParaRPr lang="pt-PT" dirty="0"/>
+              </a:p>
+              <a:p>
+                <a:pPr marL="0" indent="0">
+                  <a:lnSpc>
+                    <a:spcPct val="110000"/>
+                  </a:lnSpc>
+                  <a:buNone/>
+                </a:pPr>
+                <a:endParaRPr lang="pt-PT" dirty="0"/>
+              </a:p>
+              <a:p>
+                <a:pPr lvl="0"/>
+                <a14:m>
+                  <m:oMath xmlns:m="http://schemas.openxmlformats.org/officeDocument/2006/math">
+                    <m:sSub>
+                      <m:sSubPr>
+                        <m:ctrlPr>
+                          <a:rPr lang="pt-PT" sz="2100" i="1"/>
+                        </m:ctrlPr>
+                      </m:sSubPr>
+                      <m:e>
+                        <m:r>
+                          <m:rPr>
+                            <m:sty m:val="p"/>
+                          </m:rPr>
+                          <a:rPr lang="en-US" sz="2100"/>
+                          <m:t>Ε</m:t>
+                        </m:r>
+                      </m:e>
+                      <m:sub>
+                        <m:d>
+                          <m:dPr>
+                            <m:ctrlPr>
+                              <a:rPr lang="pt-PT" sz="2100" i="1"/>
+                            </m:ctrlPr>
+                          </m:dPr>
+                          <m:e>
+                            <m:r>
+                              <a:rPr lang="en-US" sz="2100" i="1"/>
+                              <m:t>𝑥</m:t>
+                            </m:r>
+                            <m:r>
+                              <a:rPr lang="en-US" sz="2100" i="1"/>
+                              <m:t>,</m:t>
+                            </m:r>
+                            <m:sSub>
+                              <m:sSubPr>
+                                <m:ctrlPr>
+                                  <a:rPr lang="pt-PT" sz="2100" i="1"/>
+                                </m:ctrlPr>
+                              </m:sSubPr>
+                              <m:e>
+                                <m:r>
+                                  <a:rPr lang="en-US" sz="2100" i="1"/>
+                                  <m:t>𝑦</m:t>
+                                </m:r>
+                              </m:e>
+                              <m:sub>
+                                <m:r>
+                                  <a:rPr lang="en-US" sz="2100" i="1"/>
+                                  <m:t>𝑤</m:t>
+                                </m:r>
+                              </m:sub>
+                            </m:sSub>
+                            <m:r>
+                              <a:rPr lang="en-US" sz="2100" i="1"/>
+                              <m:t>,</m:t>
+                            </m:r>
+                            <m:sSub>
+                              <m:sSubPr>
+                                <m:ctrlPr>
+                                  <a:rPr lang="pt-PT" sz="2100" i="1"/>
+                                </m:ctrlPr>
+                              </m:sSubPr>
+                              <m:e>
+                                <m:r>
+                                  <a:rPr lang="en-US" sz="2100" i="1"/>
+                                  <m:t>𝑦</m:t>
+                                </m:r>
+                              </m:e>
+                              <m:sub>
+                                <m:r>
+                                  <a:rPr lang="en-US" sz="2100" i="1"/>
+                                  <m:t>𝑙</m:t>
+                                </m:r>
+                              </m:sub>
+                            </m:sSub>
+                          </m:e>
+                        </m:d>
+                      </m:sub>
+                    </m:sSub>
+                  </m:oMath>
+                </a14:m>
+                <a:r>
+                  <a:rPr lang="en-US" sz="2100" dirty="0"/>
+                  <a:t>: Average over all samples;</a:t>
+                </a:r>
+                <a:endParaRPr lang="pt-PT" sz="2100" dirty="0"/>
+              </a:p>
+              <a:p>
+                <a:pPr lvl="0"/>
+                <a14:m>
+                  <m:oMath xmlns:m="http://schemas.openxmlformats.org/officeDocument/2006/math">
+                    <m:sSub>
+                      <m:sSubPr>
+                        <m:ctrlPr>
+                          <a:rPr lang="pt-PT" sz="2100" i="1"/>
+                        </m:ctrlPr>
+                      </m:sSubPr>
+                      <m:e>
+                        <m:r>
+                          <a:rPr lang="en-US" sz="2100" i="1"/>
+                          <m:t>𝑟</m:t>
+                        </m:r>
+                      </m:e>
+                      <m:sub>
+                        <m:r>
+                          <a:rPr lang="en-US" sz="2100" i="1"/>
+                          <m:t>𝜃</m:t>
+                        </m:r>
+                      </m:sub>
+                    </m:sSub>
+                    <m:d>
+                      <m:dPr>
+                        <m:ctrlPr>
+                          <a:rPr lang="pt-PT" sz="2100" i="1"/>
+                        </m:ctrlPr>
+                      </m:dPr>
+                      <m:e>
+                        <m:r>
+                          <a:rPr lang="en-US" sz="2100" i="1"/>
+                          <m:t>𝑥</m:t>
+                        </m:r>
+                        <m:r>
+                          <a:rPr lang="en-US" sz="2100" i="1"/>
+                          <m:t>, </m:t>
+                        </m:r>
+                        <m:r>
+                          <a:rPr lang="en-US" sz="2100" i="1"/>
+                          <m:t>𝑦</m:t>
+                        </m:r>
+                      </m:e>
+                    </m:d>
+                  </m:oMath>
+                </a14:m>
+                <a:r>
+                  <a:rPr lang="en-US" sz="2100" dirty="0"/>
+                  <a:t>: reward that the RM gives to response </a:t>
+                </a:r>
+                <a14:m>
+                  <m:oMath xmlns:m="http://schemas.openxmlformats.org/officeDocument/2006/math">
+                    <m:r>
+                      <a:rPr lang="pt-PT" sz="2100" i="1"/>
+                      <m:t>𝑦</m:t>
+                    </m:r>
+                  </m:oMath>
+                </a14:m>
+                <a:r>
+                  <a:rPr lang="en-US" sz="2100" dirty="0"/>
+                  <a:t> for prompt </a:t>
+                </a:r>
+                <a14:m>
+                  <m:oMath xmlns:m="http://schemas.openxmlformats.org/officeDocument/2006/math">
+                    <m:r>
+                      <a:rPr lang="pt-PT" sz="2100" i="1"/>
+                      <m:t>𝑥</m:t>
+                    </m:r>
+                  </m:oMath>
+                </a14:m>
+                <a:r>
+                  <a:rPr lang="en-US" sz="2100" dirty="0"/>
+                  <a:t>;</a:t>
+                </a:r>
+                <a:endParaRPr lang="pt-PT" sz="2100" dirty="0"/>
+              </a:p>
+              <a:p>
+                <a:pPr lvl="0"/>
+                <a14:m>
+                  <m:oMath xmlns:m="http://schemas.openxmlformats.org/officeDocument/2006/math">
+                    <m:sSub>
+                      <m:sSubPr>
+                        <m:ctrlPr>
+                          <a:rPr lang="pt-PT" sz="2100" i="1"/>
+                        </m:ctrlPr>
+                      </m:sSubPr>
+                      <m:e>
+                        <m:r>
+                          <a:rPr lang="en-US" sz="2100" i="1"/>
+                          <m:t>𝑦</m:t>
+                        </m:r>
+                      </m:e>
+                      <m:sub>
+                        <m:r>
+                          <a:rPr lang="en-US" sz="2100" i="1"/>
+                          <m:t>𝑤</m:t>
+                        </m:r>
+                      </m:sub>
+                    </m:sSub>
+                  </m:oMath>
+                </a14:m>
+                <a:r>
+                  <a:rPr lang="pt-PT" sz="2100" dirty="0"/>
+                  <a:t>: </a:t>
+                </a:r>
+                <a:r>
+                  <a:rPr lang="pt-PT" sz="2100" dirty="0" err="1"/>
+                  <a:t>preferred</a:t>
+                </a:r>
+                <a:r>
+                  <a:rPr lang="pt-PT" sz="2100" dirty="0"/>
+                  <a:t> (</a:t>
+                </a:r>
+                <a:r>
+                  <a:rPr lang="pt-PT" sz="2100" dirty="0" err="1"/>
+                  <a:t>winning</a:t>
+                </a:r>
+                <a:r>
+                  <a:rPr lang="pt-PT" sz="2100" dirty="0"/>
+                  <a:t>) output;</a:t>
+                </a:r>
+              </a:p>
+              <a:p>
+                <a:pPr lvl="0"/>
+                <a14:m>
+                  <m:oMath xmlns:m="http://schemas.openxmlformats.org/officeDocument/2006/math">
+                    <m:sSub>
+                      <m:sSubPr>
+                        <m:ctrlPr>
+                          <a:rPr lang="pt-PT" sz="2100" i="1"/>
+                        </m:ctrlPr>
+                      </m:sSubPr>
+                      <m:e>
+                        <m:r>
+                          <a:rPr lang="en-US" sz="2100" i="1"/>
+                          <m:t>𝑦</m:t>
+                        </m:r>
+                      </m:e>
+                      <m:sub>
+                        <m:r>
+                          <a:rPr lang="en-US" sz="2100" i="1"/>
+                          <m:t>𝑙</m:t>
+                        </m:r>
+                      </m:sub>
+                    </m:sSub>
+                  </m:oMath>
+                </a14:m>
+                <a:r>
+                  <a:rPr lang="en-US" sz="2100" dirty="0"/>
+                  <a:t>: less preferred (losing) output;</a:t>
+                </a:r>
+                <a:endParaRPr lang="pt-PT" sz="2100" dirty="0"/>
+              </a:p>
+              <a:p>
+                <a:pPr lvl="0"/>
+                <a14:m>
+                  <m:oMath xmlns:m="http://schemas.openxmlformats.org/officeDocument/2006/math">
+                    <m:r>
+                      <a:rPr lang="en-US" sz="2100" i="1"/>
+                      <m:t>𝜎</m:t>
+                    </m:r>
+                  </m:oMath>
+                </a14:m>
+                <a:r>
+                  <a:rPr lang="en-US" sz="2100" dirty="0"/>
+                  <a:t>: sigmoid function → forces higher score for preferred output</a:t>
+                </a:r>
+              </a:p>
+              <a:p>
+                <a:pPr lvl="0"/>
+                <a:endParaRPr lang="en-US" sz="2000" dirty="0">
+                  <a:latin typeface="Abadi" panose="020B0604020104020204" pitchFamily="34" charset="0"/>
+                </a:endParaRPr>
+              </a:p>
+              <a:p>
+                <a:pPr marL="0" lvl="0" indent="0">
+                  <a:buNone/>
+                </a:pPr>
+                <a:r>
+                  <a:rPr lang="en-US" sz="3000" dirty="0"/>
+                  <a:t>Intuition: </a:t>
+                </a:r>
+              </a:p>
+              <a:p>
+                <a:pPr marL="0" lvl="0" indent="0">
+                  <a:buNone/>
+                </a:pPr>
+                <a:r>
+                  <a:rPr lang="en-US" sz="3000" dirty="0"/>
+                  <a:t>	RM learns: “If humans like A more than B </a:t>
+                </a:r>
+                <a:r>
+                  <a:rPr lang="en-US" sz="3300" dirty="0"/>
+                  <a:t>→ give A </a:t>
+                </a:r>
+                <a:r>
+                  <a:rPr lang="en-US" sz="3300" dirty="0" err="1"/>
+                  <a:t>a</a:t>
+                </a:r>
+                <a:r>
+                  <a:rPr lang="en-US" sz="3300" dirty="0"/>
+                  <a:t> higher reward.”</a:t>
+                </a:r>
+                <a:endParaRPr lang="en-US" sz="3900" dirty="0"/>
+              </a:p>
+            </p:txBody>
+          </p:sp>
+        </mc:Choice>
+        <mc:Fallback>
+          <p:sp>
+            <p:nvSpPr>
+              <p:cNvPr id="3" name="Content Placeholder 2">
+                <a:extLst>
+                  <a:ext uri="{FF2B5EF4-FFF2-40B4-BE49-F238E27FC236}">
+                    <a16:creationId xmlns:a16="http://schemas.microsoft.com/office/drawing/2014/main" id="{02769172-6863-6D57-F88A-AD5DD5255A8A}"/>
+                  </a:ext>
+                </a:extLst>
+              </p:cNvPr>
+              <p:cNvSpPr>
+                <a:spLocks noGrp="1" noRot="1" noChangeAspect="1" noMove="1" noResize="1" noEditPoints="1" noAdjustHandles="1" noChangeArrowheads="1" noChangeShapeType="1" noTextEdit="1"/>
+              </p:cNvSpPr>
+              <p:nvPr>
+                <p:ph idx="1"/>
+              </p:nvPr>
+            </p:nvSpPr>
+            <p:spPr>
+              <a:xfrm>
+                <a:off x="532151" y="1491521"/>
+                <a:ext cx="11407515" cy="4991726"/>
+              </a:xfrm>
+              <a:blipFill>
+                <a:blip r:embed="rId2"/>
+                <a:stretch>
+                  <a:fillRect l="-962" t="-1587"/>
+                </a:stretch>
+              </a:blipFill>
+            </p:spPr>
+            <p:txBody>
+              <a:bodyPr/>
+              <a:lstStyle/>
+              <a:p>
+                <a:r>
+                  <a:rPr lang="en-US">
+                    <a:noFill/>
+                  </a:rPr>
+                  <a:t> </a:t>
+                </a:r>
+              </a:p>
+            </p:txBody>
+          </p:sp>
+        </mc:Fallback>
+      </mc:AlternateContent>
+    </p:spTree>
+    <p:extLst>
+      <p:ext uri="{BB962C8B-B14F-4D97-AF65-F5344CB8AC3E}">
+        <p14:creationId xmlns:p14="http://schemas.microsoft.com/office/powerpoint/2010/main" val="2977701653"/>
+      </p:ext>
+    </p:extLst>
+  </p:cSld>
+  <p:clrMapOvr>
+    <a:masterClrMapping/>
+  </p:clrMapOvr>
+</p:sld>
+</file>
+
+<file path=ppt/slides/slide4.xml><?xml version="1.0" encoding="utf-8"?>
+<p:sld xmlns:a="http://schemas.openxmlformats.org/drawingml/2006/main" xmlns:r="http://schemas.openxmlformats.org/officeDocument/2006/relationships" xmlns:p="http://schemas.openxmlformats.org/presentationml/2006/main">
+  <p:cSld>
+    <p:spTree>
+      <p:nvGrpSpPr>
+        <p:cNvPr id="1" name="">
+          <a:extLst>
+            <a:ext uri="{FF2B5EF4-FFF2-40B4-BE49-F238E27FC236}">
+              <a16:creationId xmlns:a16="http://schemas.microsoft.com/office/drawing/2014/main" id="{0297FE15-08CA-A4E7-97E1-A5703CF29A98}"/>
+            </a:ext>
+          </a:extLst>
+        </p:cNvPr>
+        <p:cNvGrpSpPr/>
+        <p:nvPr/>
+      </p:nvGrpSpPr>
+      <p:grpSpPr>
+        <a:xfrm>
+          <a:off x="0" y="0"/>
+          <a:ext cx="0" cy="0"/>
+          <a:chOff x="0" y="0"/>
+          <a:chExt cx="0" cy="0"/>
+        </a:xfrm>
+      </p:grpSpPr>
+      <p:sp>
+        <p:nvSpPr>
+          <p:cNvPr id="2" name="Title 1">
+            <a:extLst>
+              <a:ext uri="{FF2B5EF4-FFF2-40B4-BE49-F238E27FC236}">
+                <a16:creationId xmlns:a16="http://schemas.microsoft.com/office/drawing/2014/main" id="{2AE3E69D-3148-677C-5CBE-DB67CB9214C8}"/>
+              </a:ext>
+            </a:extLst>
+          </p:cNvPr>
+          <p:cNvSpPr>
+            <a:spLocks noGrp="1"/>
+          </p:cNvSpPr>
+          <p:nvPr>
+            <p:ph type="title"/>
+          </p:nvPr>
+        </p:nvSpPr>
+        <p:spPr>
+          <a:xfrm>
+            <a:off x="532149" y="365125"/>
+            <a:ext cx="11407515" cy="849078"/>
+          </a:xfrm>
+        </p:spPr>
+        <p:txBody>
+          <a:bodyPr>
+            <a:normAutofit/>
+          </a:bodyPr>
+          <a:lstStyle/>
+          <a:p>
+            <a:r>
+              <a:rPr lang="en-US" dirty="0"/>
+              <a:t>Reinforcement Learning (RLHF) via PPO</a:t>
+            </a:r>
+            <a:endParaRPr lang="en-US" dirty="0">
+              <a:latin typeface="Abadi" panose="020B0604020104020204" pitchFamily="34" charset="0"/>
+            </a:endParaRPr>
+          </a:p>
+        </p:txBody>
+      </p:sp>
+      <p:sp>
+        <p:nvSpPr>
+          <p:cNvPr id="3" name="Content Placeholder 2">
+            <a:extLst>
+              <a:ext uri="{FF2B5EF4-FFF2-40B4-BE49-F238E27FC236}">
+                <a16:creationId xmlns:a16="http://schemas.microsoft.com/office/drawing/2014/main" id="{F79FD7DE-6A60-FC7E-F818-F5A8C19AFBA6}"/>
+              </a:ext>
+            </a:extLst>
+          </p:cNvPr>
+          <p:cNvSpPr>
+            <a:spLocks noGrp="1"/>
+          </p:cNvSpPr>
+          <p:nvPr>
+            <p:ph idx="1"/>
+          </p:nvPr>
+        </p:nvSpPr>
+        <p:spPr>
+          <a:xfrm>
+            <a:off x="532151" y="1491521"/>
+            <a:ext cx="11407515" cy="4991726"/>
+          </a:xfrm>
+        </p:spPr>
+        <p:txBody>
+          <a:bodyPr>
+            <a:normAutofit/>
+          </a:bodyPr>
+          <a:lstStyle/>
+          <a:p>
+            <a:pPr marL="0" indent="0">
+              <a:lnSpc>
+                <a:spcPct val="110000"/>
+              </a:lnSpc>
+              <a:buNone/>
+            </a:pPr>
+            <a:r>
+              <a:rPr lang="en-US" b="1" dirty="0"/>
+              <a:t>Goal: </a:t>
+            </a:r>
+            <a:r>
+              <a:rPr lang="en-US" dirty="0"/>
+              <a:t>Fine-tune the model to maximize the RM’s reward signal.</a:t>
+            </a:r>
+          </a:p>
+          <a:p>
+            <a:pPr marL="0" indent="0">
+              <a:lnSpc>
+                <a:spcPct val="110000"/>
+              </a:lnSpc>
+              <a:buNone/>
+            </a:pPr>
+            <a:r>
+              <a:rPr lang="en-US" b="1" dirty="0"/>
+              <a:t>Feedback loop:</a:t>
+            </a:r>
+          </a:p>
+          <a:p>
+            <a:pPr marL="0" indent="0">
+              <a:lnSpc>
+                <a:spcPct val="110000"/>
+              </a:lnSpc>
+              <a:buNone/>
+            </a:pPr>
+            <a:r>
+              <a:rPr lang="en-US" dirty="0"/>
+              <a:t>SFT model generates outputs → RM evaluates them → RLHF model learns to maximize the reward.</a:t>
+            </a:r>
+            <a:endParaRPr lang="pt-PT" dirty="0"/>
+          </a:p>
+          <a:p>
+            <a:pPr marL="0" indent="0">
+              <a:lnSpc>
+                <a:spcPct val="110000"/>
+              </a:lnSpc>
+              <a:buNone/>
+            </a:pPr>
+            <a:r>
+              <a:rPr lang="en-US" b="1" dirty="0"/>
+              <a:t>Challenge: </a:t>
+            </a:r>
+            <a:r>
+              <a:rPr lang="en-US" dirty="0"/>
+              <a:t>Model may “forget” what it learned in SFT.</a:t>
+            </a:r>
+          </a:p>
+          <a:p>
+            <a:pPr marL="0" indent="0">
+              <a:lnSpc>
+                <a:spcPct val="110000"/>
+              </a:lnSpc>
+              <a:buNone/>
+            </a:pPr>
+            <a:r>
+              <a:rPr lang="en-US" b="1" dirty="0"/>
+              <a:t>Solution: </a:t>
+            </a:r>
+            <a:r>
+              <a:rPr lang="en-US" dirty="0"/>
+              <a:t>Add a penalty term to keep it close to the SFT policy.</a:t>
+            </a:r>
+            <a:endParaRPr lang="en-US" b="1" dirty="0"/>
+          </a:p>
+        </p:txBody>
+      </p:sp>
+    </p:spTree>
+    <p:extLst>
+      <p:ext uri="{BB962C8B-B14F-4D97-AF65-F5344CB8AC3E}">
+        <p14:creationId xmlns:p14="http://schemas.microsoft.com/office/powerpoint/2010/main" val="1845921384"/>
+      </p:ext>
+    </p:extLst>
+  </p:cSld>
+  <p:clrMapOvr>
+    <a:masterClrMapping/>
+  </p:clrMapOvr>
+</p:sld>
+</file>
+
+<file path=ppt/slides/slide5.xml><?xml version="1.0" encoding="utf-8"?>
+<p:sld xmlns:a="http://schemas.openxmlformats.org/drawingml/2006/main" xmlns:r="http://schemas.openxmlformats.org/officeDocument/2006/relationships" xmlns:p="http://schemas.openxmlformats.org/presentationml/2006/main">
+  <p:cSld>
+    <p:spTree>
+      <p:nvGrpSpPr>
+        <p:cNvPr id="1" name="">
+          <a:extLst>
+            <a:ext uri="{FF2B5EF4-FFF2-40B4-BE49-F238E27FC236}">
+              <a16:creationId xmlns:a16="http://schemas.microsoft.com/office/drawing/2014/main" id="{B0B223DC-415E-79C1-6C56-B2615ADDEC93}"/>
+            </a:ext>
+          </a:extLst>
+        </p:cNvPr>
+        <p:cNvGrpSpPr/>
+        <p:nvPr/>
+      </p:nvGrpSpPr>
+      <p:grpSpPr>
+        <a:xfrm>
+          <a:off x="0" y="0"/>
+          <a:ext cx="0" cy="0"/>
+          <a:chOff x="0" y="0"/>
+          <a:chExt cx="0" cy="0"/>
+        </a:xfrm>
+      </p:grpSpPr>
+      <p:sp>
+        <p:nvSpPr>
+          <p:cNvPr id="2" name="Title 1">
+            <a:extLst>
+              <a:ext uri="{FF2B5EF4-FFF2-40B4-BE49-F238E27FC236}">
+                <a16:creationId xmlns:a16="http://schemas.microsoft.com/office/drawing/2014/main" id="{C585ABA1-35C8-3BEA-9483-E9C8757C4682}"/>
+              </a:ext>
+            </a:extLst>
+          </p:cNvPr>
+          <p:cNvSpPr>
+            <a:spLocks noGrp="1"/>
+          </p:cNvSpPr>
+          <p:nvPr>
+            <p:ph type="title"/>
+          </p:nvPr>
+        </p:nvSpPr>
+        <p:spPr>
+          <a:xfrm>
+            <a:off x="532149" y="365125"/>
+            <a:ext cx="11407515" cy="849078"/>
+          </a:xfrm>
+        </p:spPr>
+        <p:txBody>
+          <a:bodyPr>
+            <a:normAutofit/>
+          </a:bodyPr>
+          <a:lstStyle/>
+          <a:p>
+            <a:r>
+              <a:rPr lang="en-US" dirty="0"/>
+              <a:t>Reinforcement Learning (RLHF) via PPO - Penalty</a:t>
+            </a:r>
+            <a:endParaRPr lang="en-US" dirty="0">
+              <a:latin typeface="Abadi" panose="020B0604020104020204" pitchFamily="34" charset="0"/>
+            </a:endParaRPr>
+          </a:p>
+        </p:txBody>
+      </p:sp>
+      <mc:AlternateContent xmlns:mc="http://schemas.openxmlformats.org/markup-compatibility/2006">
+        <mc:Choice xmlns:a14="http://schemas.microsoft.com/office/drawing/2010/main" Requires="a14">
+          <p:sp>
+            <p:nvSpPr>
+              <p:cNvPr id="3" name="Content Placeholder 2">
+                <a:extLst>
+                  <a:ext uri="{FF2B5EF4-FFF2-40B4-BE49-F238E27FC236}">
+                    <a16:creationId xmlns:a16="http://schemas.microsoft.com/office/drawing/2014/main" id="{6F3D3C93-8386-F46E-225D-1C93A5E00B5F}"/>
+                  </a:ext>
+                </a:extLst>
+              </p:cNvPr>
+              <p:cNvSpPr>
+                <a:spLocks noGrp="1"/>
+              </p:cNvSpPr>
+              <p:nvPr>
+                <p:ph idx="1"/>
+              </p:nvPr>
+            </p:nvSpPr>
+            <p:spPr>
+              <a:xfrm>
+                <a:off x="532151" y="1491521"/>
+                <a:ext cx="11407515" cy="4991726"/>
+              </a:xfrm>
+            </p:spPr>
+            <p:txBody>
+              <a:bodyPr>
+                <a:normAutofit fontScale="92500" lnSpcReduction="20000"/>
+              </a:bodyPr>
+              <a:lstStyle/>
+              <a:p>
+                <a:pPr marL="0" indent="0">
+                  <a:lnSpc>
+                    <a:spcPct val="110000"/>
+                  </a:lnSpc>
+                  <a:buNone/>
+                </a:pPr>
+                <a:r>
+                  <a:rPr lang="pt-PT" dirty="0"/>
+                  <a:t>Penalty </a:t>
+                </a:r>
+                <a:r>
+                  <a:rPr lang="pt-PT" dirty="0" err="1"/>
+                  <a:t>Function</a:t>
+                </a:r>
+                <a:r>
+                  <a:rPr lang="pt-PT" dirty="0"/>
+                  <a:t>:</a:t>
+                </a:r>
+              </a:p>
+              <a:p>
+                <a:pPr marL="0" indent="0">
+                  <a:lnSpc>
+                    <a:spcPct val="110000"/>
+                  </a:lnSpc>
+                  <a:buNone/>
+                </a:pPr>
+                <a:endParaRPr lang="pt-PT" dirty="0"/>
+              </a:p>
+              <a:p>
+                <a:pPr marL="0" indent="0">
+                  <a:lnSpc>
+                    <a:spcPct val="110000"/>
+                  </a:lnSpc>
+                  <a:buNone/>
+                </a:pPr>
+                <a14:m>
+                  <m:oMathPara xmlns:m="http://schemas.openxmlformats.org/officeDocument/2006/math">
+                    <m:oMathParaPr>
+                      <m:jc m:val="centerGroup"/>
+                    </m:oMathParaPr>
+                    <m:oMath xmlns:m="http://schemas.openxmlformats.org/officeDocument/2006/math">
+                      <m:r>
+                        <a:rPr lang="en-US" i="1"/>
+                        <m:t>𝑝𝑒𝑛𝑎𝑙𝑡𝑦</m:t>
+                      </m:r>
+                      <m:r>
+                        <a:rPr lang="en-US" i="1"/>
+                        <m:t>= </m:t>
+                      </m:r>
+                      <m:r>
+                        <a:rPr lang="en-US" i="1"/>
+                        <m:t>𝛽</m:t>
+                      </m:r>
+                      <m:r>
+                        <a:rPr lang="en-US" i="1"/>
+                        <m:t> ∙</m:t>
+                      </m:r>
+                      <m:r>
+                        <a:rPr lang="en-US" i="1"/>
+                        <m:t>𝑙𝑜𝑔</m:t>
+                      </m:r>
+                      <m:f>
+                        <m:fPr>
+                          <m:ctrlPr>
+                            <a:rPr lang="pt-PT" i="1"/>
+                          </m:ctrlPr>
+                        </m:fPr>
+                        <m:num>
+                          <m:sSub>
+                            <m:sSubPr>
+                              <m:ctrlPr>
+                                <a:rPr lang="pt-PT" i="1"/>
+                              </m:ctrlPr>
+                            </m:sSubPr>
+                            <m:e>
+                              <m:r>
+                                <a:rPr lang="en-US" i="1"/>
+                                <m:t>𝜋</m:t>
+                              </m:r>
+                            </m:e>
+                            <m:sub>
+                              <m:r>
+                                <a:rPr lang="en-US" i="1"/>
+                                <m:t>𝑅𝐿</m:t>
+                              </m:r>
+                            </m:sub>
+                          </m:sSub>
+                          <m:r>
+                            <a:rPr lang="en-US" i="1"/>
+                            <m:t>(</m:t>
+                          </m:r>
+                          <m:r>
+                            <a:rPr lang="en-US" i="1"/>
+                            <m:t>𝑦</m:t>
+                          </m:r>
+                          <m:r>
+                            <a:rPr lang="en-US" i="1"/>
+                            <m:t>|</m:t>
+                          </m:r>
+                          <m:r>
+                            <a:rPr lang="en-US" i="1"/>
+                            <m:t>𝑥</m:t>
+                          </m:r>
+                          <m:r>
+                            <a:rPr lang="en-US" i="1"/>
+                            <m:t>)</m:t>
+                          </m:r>
+                        </m:num>
+                        <m:den>
+                          <m:sSub>
+                            <m:sSubPr>
+                              <m:ctrlPr>
+                                <a:rPr lang="pt-PT" i="1"/>
+                              </m:ctrlPr>
+                            </m:sSubPr>
+                            <m:e>
+                              <m:r>
+                                <a:rPr lang="en-US" i="1"/>
+                                <m:t>𝜋</m:t>
+                              </m:r>
+                            </m:e>
+                            <m:sub>
+                              <m:r>
+                                <a:rPr lang="en-US" i="1"/>
+                                <m:t>𝑆𝐹𝑇</m:t>
+                              </m:r>
+                            </m:sub>
+                          </m:sSub>
+                          <m:r>
+                            <a:rPr lang="en-US" i="1"/>
+                            <m:t>(</m:t>
+                          </m:r>
+                          <m:r>
+                            <a:rPr lang="en-US" i="1"/>
+                            <m:t>𝑦</m:t>
+                          </m:r>
+                          <m:r>
+                            <a:rPr lang="en-US" i="1"/>
+                            <m:t>|</m:t>
+                          </m:r>
+                          <m:r>
+                            <a:rPr lang="en-US" i="1"/>
+                            <m:t>𝑥</m:t>
+                          </m:r>
+                          <m:r>
+                            <a:rPr lang="en-US" i="1"/>
+                            <m:t>)</m:t>
+                          </m:r>
+                        </m:den>
+                      </m:f>
+                    </m:oMath>
+                  </m:oMathPara>
+                </a14:m>
+                <a:endParaRPr lang="pt-PT" dirty="0"/>
+              </a:p>
+              <a:p>
+                <a:pPr marL="0" indent="0">
+                  <a:lnSpc>
+                    <a:spcPct val="110000"/>
+                  </a:lnSpc>
+                  <a:buNone/>
+                </a:pPr>
+                <a:endParaRPr lang="en-US" dirty="0"/>
+              </a:p>
+              <a:p>
+                <a:pPr lvl="0"/>
+                <a14:m>
+                  <m:oMath xmlns:m="http://schemas.openxmlformats.org/officeDocument/2006/math">
+                    <m:sSub>
+                      <m:sSubPr>
+                        <m:ctrlPr>
+                          <a:rPr lang="pt-PT" sz="1800" i="1"/>
+                        </m:ctrlPr>
+                      </m:sSubPr>
+                      <m:e>
+                        <m:r>
+                          <a:rPr lang="en-US" sz="1800" i="1"/>
+                          <m:t>𝜋</m:t>
+                        </m:r>
+                      </m:e>
+                      <m:sub>
+                        <m:r>
+                          <a:rPr lang="en-US" sz="1800" i="1"/>
+                          <m:t>𝑅𝐿</m:t>
+                        </m:r>
+                      </m:sub>
+                    </m:sSub>
+                    <m:r>
+                      <a:rPr lang="en-US" sz="1800" i="1"/>
+                      <m:t>(</m:t>
+                    </m:r>
+                    <m:r>
+                      <a:rPr lang="en-US" sz="1800" i="1"/>
+                      <m:t>𝑦</m:t>
+                    </m:r>
+                    <m:r>
+                      <a:rPr lang="en-US" sz="1800" i="1"/>
+                      <m:t>|</m:t>
+                    </m:r>
+                    <m:r>
+                      <a:rPr lang="en-US" sz="1800" i="1"/>
+                      <m:t>𝑥</m:t>
+                    </m:r>
+                    <m:r>
+                      <a:rPr lang="en-US" sz="1800" i="1"/>
+                      <m:t>)</m:t>
+                    </m:r>
+                  </m:oMath>
+                </a14:m>
+                <a:r>
+                  <a:rPr lang="en-US" sz="1800" dirty="0"/>
+                  <a:t>: Current model (being trained)</a:t>
+                </a:r>
+                <a:endParaRPr lang="pt-PT" sz="1800" dirty="0"/>
+              </a:p>
+              <a:p>
+                <a:pPr lvl="0"/>
+                <a14:m>
+                  <m:oMath xmlns:m="http://schemas.openxmlformats.org/officeDocument/2006/math">
+                    <m:sSub>
+                      <m:sSubPr>
+                        <m:ctrlPr>
+                          <a:rPr lang="pt-PT" sz="1800" i="1"/>
+                        </m:ctrlPr>
+                      </m:sSubPr>
+                      <m:e>
+                        <m:r>
+                          <a:rPr lang="en-US" sz="1800" i="1"/>
+                          <m:t>𝜋</m:t>
+                        </m:r>
+                      </m:e>
+                      <m:sub>
+                        <m:r>
+                          <a:rPr lang="en-US" sz="1800" i="1"/>
+                          <m:t>𝑆𝐹𝑇</m:t>
+                        </m:r>
+                      </m:sub>
+                    </m:sSub>
+                    <m:d>
+                      <m:dPr>
+                        <m:ctrlPr>
+                          <a:rPr lang="pt-PT" sz="1800" i="1"/>
+                        </m:ctrlPr>
+                      </m:dPr>
+                      <m:e>
+                        <m:r>
+                          <a:rPr lang="en-US" sz="1800" i="1"/>
+                          <m:t>𝑦</m:t>
+                        </m:r>
+                      </m:e>
+                      <m:e>
+                        <m:r>
+                          <a:rPr lang="en-US" sz="1800" i="1"/>
+                          <m:t>𝑥</m:t>
+                        </m:r>
+                      </m:e>
+                    </m:d>
+                  </m:oMath>
+                </a14:m>
+                <a:r>
+                  <a:rPr lang="en-US" sz="1800" dirty="0"/>
+                  <a:t>: Base Model</a:t>
+                </a:r>
+                <a:endParaRPr lang="pt-PT" sz="1800" dirty="0"/>
+              </a:p>
+              <a:p>
+                <a:pPr lvl="0"/>
+                <a14:m>
+                  <m:oMath xmlns:m="http://schemas.openxmlformats.org/officeDocument/2006/math">
+                    <m:r>
+                      <a:rPr lang="en-US" sz="1800" i="1"/>
+                      <m:t>𝛽</m:t>
+                    </m:r>
+                  </m:oMath>
+                </a14:m>
+                <a:r>
+                  <a:rPr lang="en-US" sz="1800" dirty="0"/>
+                  <a:t>: </a:t>
+                </a:r>
+                <a:r>
+                  <a:rPr lang="pt-PT" sz="1800" dirty="0" err="1"/>
+                  <a:t>Controls</a:t>
+                </a:r>
+                <a:r>
+                  <a:rPr lang="pt-PT" sz="1800" dirty="0"/>
+                  <a:t> </a:t>
+                </a:r>
+                <a:r>
+                  <a:rPr lang="pt-PT" sz="1800" dirty="0" err="1"/>
+                  <a:t>how</a:t>
+                </a:r>
+                <a:r>
+                  <a:rPr lang="pt-PT" sz="1800" dirty="0"/>
+                  <a:t> </a:t>
+                </a:r>
+                <a:r>
+                  <a:rPr lang="pt-PT" sz="1800" dirty="0" err="1"/>
+                  <a:t>much</a:t>
+                </a:r>
+                <a:r>
+                  <a:rPr lang="pt-PT" sz="1800" dirty="0"/>
+                  <a:t> </a:t>
+                </a:r>
+                <a:r>
+                  <a:rPr lang="pt-PT" sz="1800" dirty="0" err="1"/>
+                  <a:t>deviation</a:t>
+                </a:r>
+                <a:r>
+                  <a:rPr lang="pt-PT" sz="1800" dirty="0"/>
+                  <a:t> </a:t>
+                </a:r>
+                <a:r>
+                  <a:rPr lang="pt-PT" sz="1800" dirty="0" err="1"/>
+                  <a:t>is</a:t>
+                </a:r>
+                <a:r>
+                  <a:rPr lang="pt-PT" sz="1800" dirty="0"/>
+                  <a:t> </a:t>
+                </a:r>
+                <a:r>
+                  <a:rPr lang="pt-PT" sz="1800" dirty="0" err="1"/>
+                  <a:t>penalized</a:t>
+                </a:r>
+                <a:endParaRPr lang="pt-PT" sz="1800" dirty="0"/>
+              </a:p>
+              <a:p>
+                <a:pPr marL="0" lvl="0" indent="0">
+                  <a:buNone/>
+                </a:pPr>
+                <a:endParaRPr lang="en-US" dirty="0"/>
+              </a:p>
+              <a:p>
+                <a:pPr marL="0" lvl="0" indent="0">
+                  <a:buNone/>
+                </a:pPr>
+                <a:r>
+                  <a:rPr lang="en-US" dirty="0"/>
+                  <a:t>Intuition: </a:t>
+                </a:r>
+              </a:p>
+              <a:p>
+                <a:pPr marL="0" lvl="0" indent="0">
+                  <a:buNone/>
+                </a:pPr>
+                <a:r>
+                  <a:rPr lang="en-US" dirty="0"/>
+                  <a:t>	Penalty teaches the model: “Increase rewards from human 		feedback but stay close to the original SFT behavior</a:t>
+                </a:r>
+                <a:r>
+                  <a:rPr lang="en-US" sz="3200" dirty="0"/>
+                  <a:t>.”</a:t>
+                </a:r>
+                <a:endParaRPr lang="en-US" sz="3600" dirty="0"/>
+              </a:p>
+            </p:txBody>
+          </p:sp>
+        </mc:Choice>
+        <mc:Fallback>
+          <p:sp>
+            <p:nvSpPr>
+              <p:cNvPr id="3" name="Content Placeholder 2">
+                <a:extLst>
+                  <a:ext uri="{FF2B5EF4-FFF2-40B4-BE49-F238E27FC236}">
+                    <a16:creationId xmlns:a16="http://schemas.microsoft.com/office/drawing/2014/main" id="{6F3D3C93-8386-F46E-225D-1C93A5E00B5F}"/>
+                  </a:ext>
+                </a:extLst>
+              </p:cNvPr>
+              <p:cNvSpPr>
+                <a:spLocks noGrp="1" noRot="1" noChangeAspect="1" noMove="1" noResize="1" noEditPoints="1" noAdjustHandles="1" noChangeArrowheads="1" noChangeShapeType="1" noTextEdit="1"/>
+              </p:cNvSpPr>
+              <p:nvPr>
+                <p:ph idx="1"/>
+              </p:nvPr>
+            </p:nvSpPr>
+            <p:spPr>
+              <a:xfrm>
+                <a:off x="532151" y="1491521"/>
+                <a:ext cx="11407515" cy="4991726"/>
+              </a:xfrm>
+              <a:blipFill>
+                <a:blip r:embed="rId2"/>
+                <a:stretch>
+                  <a:fillRect l="-962" t="-1954" b="-122"/>
+                </a:stretch>
+              </a:blipFill>
+            </p:spPr>
+            <p:txBody>
+              <a:bodyPr/>
+              <a:lstStyle/>
+              <a:p>
+                <a:r>
+                  <a:rPr lang="en-US">
+                    <a:noFill/>
+                  </a:rPr>
+                  <a:t> </a:t>
+                </a:r>
+              </a:p>
+            </p:txBody>
+          </p:sp>
+        </mc:Fallback>
+      </mc:AlternateContent>
+    </p:spTree>
+    <p:extLst>
+      <p:ext uri="{BB962C8B-B14F-4D97-AF65-F5344CB8AC3E}">
+        <p14:creationId xmlns:p14="http://schemas.microsoft.com/office/powerpoint/2010/main" val="3019968326"/>
+      </p:ext>
+    </p:extLst>
+  </p:cSld>
+  <p:clrMapOvr>
+    <a:masterClrMapping/>
+  </p:clrMapOvr>
+</p:sld>
+</file>
+
+<file path=ppt/slides/slide6.xml><?xml version="1.0" encoding="utf-8"?>
+<p:sld xmlns:a="http://schemas.openxmlformats.org/drawingml/2006/main" xmlns:r="http://schemas.openxmlformats.org/officeDocument/2006/relationships" xmlns:p="http://schemas.openxmlformats.org/presentationml/2006/main">
+  <p:cSld>
+    <p:spTree>
+      <p:nvGrpSpPr>
+        <p:cNvPr id="1" name="">
+          <a:extLst>
+            <a:ext uri="{FF2B5EF4-FFF2-40B4-BE49-F238E27FC236}">
+              <a16:creationId xmlns:a16="http://schemas.microsoft.com/office/drawing/2014/main" id="{8DF67058-4784-B74B-D10A-324F2B9F8255}"/>
+            </a:ext>
+          </a:extLst>
+        </p:cNvPr>
+        <p:cNvGrpSpPr/>
+        <p:nvPr/>
+      </p:nvGrpSpPr>
+      <p:grpSpPr>
+        <a:xfrm>
+          <a:off x="0" y="0"/>
+          <a:ext cx="0" cy="0"/>
+          <a:chOff x="0" y="0"/>
+          <a:chExt cx="0" cy="0"/>
+        </a:xfrm>
+      </p:grpSpPr>
+      <p:sp>
+        <p:nvSpPr>
+          <p:cNvPr id="2" name="Title 1">
+            <a:extLst>
+              <a:ext uri="{FF2B5EF4-FFF2-40B4-BE49-F238E27FC236}">
+                <a16:creationId xmlns:a16="http://schemas.microsoft.com/office/drawing/2014/main" id="{C0B677D4-E6F4-0960-1EAC-05FB7915A0E3}"/>
+              </a:ext>
+            </a:extLst>
+          </p:cNvPr>
+          <p:cNvSpPr>
+            <a:spLocks noGrp="1"/>
+          </p:cNvSpPr>
+          <p:nvPr>
+            <p:ph type="title"/>
+          </p:nvPr>
+        </p:nvSpPr>
+        <p:spPr>
+          <a:xfrm>
+            <a:off x="532149" y="365125"/>
+            <a:ext cx="11407515" cy="849078"/>
+          </a:xfrm>
+        </p:spPr>
+        <p:txBody>
+          <a:bodyPr>
+            <a:normAutofit fontScale="90000"/>
+          </a:bodyPr>
+          <a:lstStyle/>
+          <a:p>
+            <a:r>
+              <a:rPr lang="en-US" dirty="0"/>
+              <a:t>Reinforcement Learning (RLHF) via PPO - Objective</a:t>
+            </a:r>
+            <a:endParaRPr lang="en-US" dirty="0">
+              <a:latin typeface="Abadi" panose="020B0604020104020204" pitchFamily="34" charset="0"/>
+            </a:endParaRPr>
+          </a:p>
+        </p:txBody>
+      </p:sp>
+      <mc:AlternateContent xmlns:mc="http://schemas.openxmlformats.org/markup-compatibility/2006">
+        <mc:Choice xmlns:a14="http://schemas.microsoft.com/office/drawing/2010/main" Requires="a14">
+          <p:sp>
+            <p:nvSpPr>
+              <p:cNvPr id="3" name="Content Placeholder 2">
+                <a:extLst>
+                  <a:ext uri="{FF2B5EF4-FFF2-40B4-BE49-F238E27FC236}">
+                    <a16:creationId xmlns:a16="http://schemas.microsoft.com/office/drawing/2014/main" id="{45EEFE6B-AD74-208B-8353-C7A0D4033510}"/>
+                  </a:ext>
+                </a:extLst>
+              </p:cNvPr>
+              <p:cNvSpPr>
+                <a:spLocks noGrp="1"/>
+              </p:cNvSpPr>
+              <p:nvPr>
+                <p:ph idx="1"/>
+              </p:nvPr>
+            </p:nvSpPr>
+            <p:spPr>
+              <a:xfrm>
+                <a:off x="532151" y="1491521"/>
+                <a:ext cx="11407515" cy="4991726"/>
+              </a:xfrm>
+            </p:spPr>
+            <p:txBody>
+              <a:bodyPr>
+                <a:normAutofit/>
+              </a:bodyPr>
+              <a:lstStyle/>
+              <a:p>
+                <a:pPr marL="0" indent="0">
+                  <a:lnSpc>
+                    <a:spcPct val="110000"/>
+                  </a:lnSpc>
+                  <a:buNone/>
+                </a:pPr>
+                <a:r>
+                  <a:rPr lang="pt-PT" dirty="0" err="1"/>
+                  <a:t>Objective</a:t>
+                </a:r>
+                <a:r>
+                  <a:rPr lang="pt-PT" dirty="0"/>
+                  <a:t> </a:t>
+                </a:r>
+                <a:r>
+                  <a:rPr lang="pt-PT" dirty="0" err="1"/>
+                  <a:t>Function</a:t>
+                </a:r>
+                <a:r>
+                  <a:rPr lang="pt-PT" dirty="0"/>
+                  <a:t>:</a:t>
+                </a:r>
+              </a:p>
+              <a:p>
+                <a:pPr marL="0" indent="0">
+                  <a:lnSpc>
+                    <a:spcPct val="110000"/>
+                  </a:lnSpc>
+                  <a:buNone/>
+                </a:pPr>
+                <a:endParaRPr lang="pt-PT" dirty="0"/>
+              </a:p>
+              <a:p>
+                <a:pPr marL="0" indent="0">
+                  <a:lnSpc>
+                    <a:spcPct val="110000"/>
+                  </a:lnSpc>
+                  <a:buNone/>
+                </a:pPr>
+                <a14:m>
+                  <m:oMathPara xmlns:m="http://schemas.openxmlformats.org/officeDocument/2006/math">
+                    <m:oMathParaPr>
+                      <m:jc m:val="centerGroup"/>
+                    </m:oMathParaPr>
+                    <m:oMath xmlns:m="http://schemas.openxmlformats.org/officeDocument/2006/math">
+                      <m:r>
+                        <a:rPr lang="en-US" i="1"/>
+                        <m:t>𝑂𝑏𝑗𝑒𝑐𝑡𝑖𝑣𝑒</m:t>
+                      </m:r>
+                      <m:d>
+                        <m:dPr>
+                          <m:ctrlPr>
+                            <a:rPr lang="pt-PT" i="1"/>
+                          </m:ctrlPr>
+                        </m:dPr>
+                        <m:e>
+                          <m:r>
+                            <m:rPr>
+                              <m:sty m:val="p"/>
+                            </m:rPr>
+                            <a:rPr lang="en-US"/>
+                            <m:t>Φ</m:t>
+                          </m:r>
+                        </m:e>
+                      </m:d>
+                      <m:r>
+                        <a:rPr lang="en-US" i="1"/>
+                        <m:t>= </m:t>
+                      </m:r>
+                      <m:sSub>
+                        <m:sSubPr>
+                          <m:ctrlPr>
+                            <a:rPr lang="pt-PT" i="1"/>
+                          </m:ctrlPr>
+                        </m:sSubPr>
+                        <m:e>
+                          <m:r>
+                            <m:rPr>
+                              <m:sty m:val="p"/>
+                            </m:rPr>
+                            <a:rPr lang="en-US"/>
+                            <m:t>Ε</m:t>
+                          </m:r>
+                        </m:e>
+                        <m:sub>
+                          <m:r>
+                            <a:rPr lang="en-US" i="1"/>
+                            <m:t>𝑥</m:t>
+                          </m:r>
+                          <m:r>
+                            <a:rPr lang="en-US" i="1"/>
+                            <m:t>,</m:t>
+                          </m:r>
+                          <m:r>
+                            <a:rPr lang="en-US" i="1"/>
+                            <m:t>𝑦</m:t>
+                          </m:r>
+                        </m:sub>
+                      </m:sSub>
+                      <m:r>
+                        <a:rPr lang="en-US" i="1"/>
+                        <m:t>[</m:t>
+                      </m:r>
+                      <m:sSub>
+                        <m:sSubPr>
+                          <m:ctrlPr>
+                            <a:rPr lang="pt-PT" i="1"/>
+                          </m:ctrlPr>
+                        </m:sSubPr>
+                        <m:e>
+                          <m:r>
+                            <a:rPr lang="en-US" i="1"/>
+                            <m:t>𝑟</m:t>
+                          </m:r>
+                        </m:e>
+                        <m:sub>
+                          <m:r>
+                            <a:rPr lang="en-US" i="1"/>
+                            <m:t>𝜃</m:t>
+                          </m:r>
+                        </m:sub>
+                      </m:sSub>
+                      <m:d>
+                        <m:dPr>
+                          <m:ctrlPr>
+                            <a:rPr lang="pt-PT" i="1"/>
+                          </m:ctrlPr>
+                        </m:dPr>
+                        <m:e>
+                          <m:r>
+                            <a:rPr lang="en-US" i="1"/>
+                            <m:t>𝑥</m:t>
+                          </m:r>
+                          <m:r>
+                            <a:rPr lang="en-US" i="1"/>
+                            <m:t>,</m:t>
+                          </m:r>
+                          <m:sSub>
+                            <m:sSubPr>
+                              <m:ctrlPr>
+                                <a:rPr lang="pt-PT" i="1"/>
+                              </m:ctrlPr>
+                            </m:sSubPr>
+                            <m:e>
+                              <m:r>
+                                <a:rPr lang="en-US" i="1"/>
+                                <m:t>𝑦</m:t>
+                              </m:r>
+                            </m:e>
+                            <m:sub>
+                              <m:r>
+                                <a:rPr lang="en-US" i="1"/>
+                                <m:t>𝑤</m:t>
+                              </m:r>
+                            </m:sub>
+                          </m:sSub>
+                        </m:e>
+                      </m:d>
+                      <m:r>
+                        <a:rPr lang="en-US" i="1"/>
+                        <m:t>−</m:t>
+                      </m:r>
+                      <m:r>
+                        <a:rPr lang="en-US" i="1"/>
+                        <m:t>𝑝𝑒𝑛𝑎𝑙𝑡𝑦</m:t>
+                      </m:r>
+                      <m:r>
+                        <a:rPr lang="en-US" i="1"/>
+                        <m:t>] </m:t>
+                      </m:r>
+                    </m:oMath>
+                  </m:oMathPara>
+                </a14:m>
+                <a:endParaRPr lang="pt-PT" dirty="0"/>
+              </a:p>
+              <a:p>
+                <a:pPr marL="0" indent="0">
+                  <a:lnSpc>
+                    <a:spcPct val="110000"/>
+                  </a:lnSpc>
+                  <a:buNone/>
+                </a:pPr>
+                <a:endParaRPr lang="en-US" dirty="0"/>
+              </a:p>
+              <a:p>
+                <a:pPr lvl="0"/>
+                <a14:m>
+                  <m:oMath xmlns:m="http://schemas.openxmlformats.org/officeDocument/2006/math">
+                    <m:sSub>
+                      <m:sSubPr>
+                        <m:ctrlPr>
+                          <a:rPr lang="pt-PT" i="1"/>
+                        </m:ctrlPr>
+                      </m:sSubPr>
+                      <m:e>
+                        <m:r>
+                          <a:rPr lang="en-US" i="1"/>
+                          <m:t>𝑟</m:t>
+                        </m:r>
+                      </m:e>
+                      <m:sub>
+                        <m:r>
+                          <a:rPr lang="en-US" i="1"/>
+                          <m:t>𝜃</m:t>
+                        </m:r>
+                      </m:sub>
+                    </m:sSub>
+                    <m:d>
+                      <m:dPr>
+                        <m:ctrlPr>
+                          <a:rPr lang="pt-PT" i="1"/>
+                        </m:ctrlPr>
+                      </m:dPr>
+                      <m:e>
+                        <m:r>
+                          <a:rPr lang="en-US" i="1"/>
+                          <m:t>𝑥</m:t>
+                        </m:r>
+                        <m:r>
+                          <a:rPr lang="en-US" i="1"/>
+                          <m:t>, </m:t>
+                        </m:r>
+                        <m:r>
+                          <a:rPr lang="en-US" i="1"/>
+                          <m:t>𝑦</m:t>
+                        </m:r>
+                      </m:e>
+                    </m:d>
+                  </m:oMath>
+                </a14:m>
+                <a:r>
+                  <a:rPr lang="en-US" dirty="0"/>
+                  <a:t>: reward from the RM;</a:t>
+                </a:r>
+                <a:endParaRPr lang="pt-PT" dirty="0"/>
+              </a:p>
+            </p:txBody>
+          </p:sp>
+        </mc:Choice>
+        <mc:Fallback>
+          <p:sp>
+            <p:nvSpPr>
+              <p:cNvPr id="3" name="Content Placeholder 2">
+                <a:extLst>
+                  <a:ext uri="{FF2B5EF4-FFF2-40B4-BE49-F238E27FC236}">
+                    <a16:creationId xmlns:a16="http://schemas.microsoft.com/office/drawing/2014/main" id="{45EEFE6B-AD74-208B-8353-C7A0D4033510}"/>
+                  </a:ext>
+                </a:extLst>
+              </p:cNvPr>
+              <p:cNvSpPr>
+                <a:spLocks noGrp="1" noRot="1" noChangeAspect="1" noMove="1" noResize="1" noEditPoints="1" noAdjustHandles="1" noChangeArrowheads="1" noChangeShapeType="1" noTextEdit="1"/>
+              </p:cNvSpPr>
+              <p:nvPr>
+                <p:ph idx="1"/>
+              </p:nvPr>
+            </p:nvSpPr>
+            <p:spPr>
+              <a:xfrm>
+                <a:off x="532151" y="1491521"/>
+                <a:ext cx="11407515" cy="4991726"/>
+              </a:xfrm>
+              <a:blipFill>
+                <a:blip r:embed="rId2"/>
+                <a:stretch>
+                  <a:fillRect l="-1068" t="-855"/>
+                </a:stretch>
+              </a:blipFill>
+            </p:spPr>
+            <p:txBody>
+              <a:bodyPr/>
+              <a:lstStyle/>
+              <a:p>
+                <a:r>
+                  <a:rPr lang="en-US">
+                    <a:noFill/>
+                  </a:rPr>
+                  <a:t> </a:t>
+                </a:r>
+              </a:p>
+            </p:txBody>
+          </p:sp>
+        </mc:Fallback>
+      </mc:AlternateContent>
+    </p:spTree>
+    <p:extLst>
+      <p:ext uri="{BB962C8B-B14F-4D97-AF65-F5344CB8AC3E}">
+        <p14:creationId xmlns:p14="http://schemas.microsoft.com/office/powerpoint/2010/main" val="651940895"/>
+      </p:ext>
+    </p:extLst>
+  </p:cSld>
+  <p:clrMapOvr>
+    <a:masterClrMapping/>
+  </p:clrMapOvr>
+</p:sld>
+</file>
+
+<file path=ppt/slides/slide7.xml><?xml version="1.0" encoding="utf-8"?>
+<p:sld xmlns:a="http://schemas.openxmlformats.org/drawingml/2006/main" xmlns:r="http://schemas.openxmlformats.org/officeDocument/2006/relationships" xmlns:p="http://schemas.openxmlformats.org/presentationml/2006/main">
+  <p:cSld>
+    <p:spTree>
+      <p:nvGrpSpPr>
+        <p:cNvPr id="1" name="">
+          <a:extLst>
+            <a:ext uri="{FF2B5EF4-FFF2-40B4-BE49-F238E27FC236}">
+              <a16:creationId xmlns:a16="http://schemas.microsoft.com/office/drawing/2014/main" id="{D79F29BC-FAC5-73FD-B504-CA1124F1CFE6}"/>
+            </a:ext>
+          </a:extLst>
+        </p:cNvPr>
+        <p:cNvGrpSpPr/>
+        <p:nvPr/>
+      </p:nvGrpSpPr>
+      <p:grpSpPr>
+        <a:xfrm>
+          <a:off x="0" y="0"/>
+          <a:ext cx="0" cy="0"/>
+          <a:chOff x="0" y="0"/>
+          <a:chExt cx="0" cy="0"/>
+        </a:xfrm>
+      </p:grpSpPr>
+      <p:sp>
+        <p:nvSpPr>
+          <p:cNvPr id="2" name="Title 1">
+            <a:extLst>
+              <a:ext uri="{FF2B5EF4-FFF2-40B4-BE49-F238E27FC236}">
+                <a16:creationId xmlns:a16="http://schemas.microsoft.com/office/drawing/2014/main" id="{0D7E2910-CE76-805F-C90A-CAFE807A74C0}"/>
+              </a:ext>
+            </a:extLst>
+          </p:cNvPr>
+          <p:cNvSpPr>
+            <a:spLocks noGrp="1"/>
+          </p:cNvSpPr>
+          <p:nvPr>
+            <p:ph type="title"/>
+          </p:nvPr>
+        </p:nvSpPr>
+        <p:spPr>
+          <a:xfrm>
+            <a:off x="532149" y="365125"/>
+            <a:ext cx="11407515" cy="849078"/>
+          </a:xfrm>
+        </p:spPr>
+        <p:txBody>
+          <a:bodyPr>
+            <a:normAutofit/>
+          </a:bodyPr>
+          <a:lstStyle/>
+          <a:p>
+            <a:r>
+              <a:rPr lang="en-US" dirty="0"/>
+              <a:t>Reinforcement Learning (RLHF-</a:t>
+            </a:r>
+            <a:r>
+              <a:rPr lang="en-US" dirty="0" err="1"/>
+              <a:t>ptx</a:t>
+            </a:r>
+            <a:r>
+              <a:rPr lang="en-US" dirty="0"/>
+              <a:t>) via PPO-</a:t>
+            </a:r>
+            <a:r>
+              <a:rPr lang="en-US" dirty="0" err="1"/>
+              <a:t>ptx</a:t>
+            </a:r>
+            <a:endParaRPr lang="pt-PT" dirty="0"/>
+          </a:p>
+        </p:txBody>
+      </p:sp>
+      <p:sp>
+        <p:nvSpPr>
+          <p:cNvPr id="3" name="Content Placeholder 2">
+            <a:extLst>
+              <a:ext uri="{FF2B5EF4-FFF2-40B4-BE49-F238E27FC236}">
+                <a16:creationId xmlns:a16="http://schemas.microsoft.com/office/drawing/2014/main" id="{C6158289-A9FD-6079-DBD1-7DC5EBCFF218}"/>
+              </a:ext>
+            </a:extLst>
+          </p:cNvPr>
+          <p:cNvSpPr>
+            <a:spLocks noGrp="1"/>
+          </p:cNvSpPr>
+          <p:nvPr>
+            <p:ph idx="1"/>
+          </p:nvPr>
+        </p:nvSpPr>
+        <p:spPr>
+          <a:xfrm>
+            <a:off x="532151" y="1491521"/>
+            <a:ext cx="11407515" cy="4991726"/>
+          </a:xfrm>
+        </p:spPr>
+        <p:txBody>
+          <a:bodyPr>
+            <a:normAutofit/>
+          </a:bodyPr>
+          <a:lstStyle/>
+          <a:p>
+            <a:pPr marL="0" indent="0">
+              <a:lnSpc>
+                <a:spcPct val="110000"/>
+              </a:lnSpc>
+              <a:buNone/>
+            </a:pPr>
+            <a:r>
+              <a:rPr lang="pt-PT" b="1" dirty="0" err="1"/>
+              <a:t>Goal</a:t>
+            </a:r>
+            <a:r>
+              <a:rPr lang="pt-PT" b="1" dirty="0"/>
+              <a:t>: </a:t>
+            </a:r>
+            <a:r>
+              <a:rPr lang="pt-PT" dirty="0" err="1"/>
+              <a:t>Maintain</a:t>
+            </a:r>
+            <a:r>
+              <a:rPr lang="pt-PT" dirty="0"/>
+              <a:t> </a:t>
+            </a:r>
+            <a:r>
+              <a:rPr lang="pt-PT" dirty="0" err="1"/>
+              <a:t>good</a:t>
+            </a:r>
+            <a:r>
+              <a:rPr lang="pt-PT" dirty="0"/>
+              <a:t> </a:t>
+            </a:r>
+            <a:r>
+              <a:rPr lang="pt-PT" dirty="0" err="1"/>
+              <a:t>generalization</a:t>
+            </a:r>
+            <a:r>
+              <a:rPr lang="pt-PT" dirty="0"/>
+              <a:t> for </a:t>
+            </a:r>
+            <a:r>
+              <a:rPr lang="pt-PT" dirty="0" err="1"/>
+              <a:t>other</a:t>
+            </a:r>
+            <a:r>
+              <a:rPr lang="pt-PT" dirty="0"/>
+              <a:t> NLP </a:t>
+            </a:r>
+            <a:r>
+              <a:rPr lang="pt-PT" dirty="0" err="1"/>
+              <a:t>problems</a:t>
+            </a:r>
+            <a:endParaRPr lang="pt-PT" dirty="0"/>
+          </a:p>
+          <a:p>
+            <a:pPr marL="0" indent="0">
+              <a:lnSpc>
+                <a:spcPct val="110000"/>
+              </a:lnSpc>
+              <a:buNone/>
+            </a:pPr>
+            <a:r>
+              <a:rPr lang="pt-PT" b="1" dirty="0" err="1"/>
+              <a:t>Process</a:t>
+            </a:r>
+            <a:r>
+              <a:rPr lang="pt-PT" b="1" dirty="0"/>
+              <a:t>:</a:t>
+            </a:r>
+          </a:p>
+          <a:p>
+            <a:pPr>
+              <a:lnSpc>
+                <a:spcPct val="110000"/>
+              </a:lnSpc>
+            </a:pPr>
+            <a:r>
+              <a:rPr lang="pt-PT" dirty="0" err="1"/>
+              <a:t>Mix</a:t>
+            </a:r>
+            <a:r>
+              <a:rPr lang="pt-PT" dirty="0"/>
+              <a:t> </a:t>
+            </a:r>
+            <a:r>
+              <a:rPr lang="pt-PT" dirty="0" err="1"/>
+              <a:t>pretraining</a:t>
+            </a:r>
+            <a:r>
+              <a:rPr lang="pt-PT" dirty="0"/>
+              <a:t> gradientes </a:t>
+            </a:r>
+            <a:r>
+              <a:rPr lang="pt-PT" dirty="0" err="1"/>
+              <a:t>with</a:t>
+            </a:r>
+            <a:r>
+              <a:rPr lang="pt-PT" dirty="0"/>
+              <a:t> PPO</a:t>
+            </a:r>
+          </a:p>
+          <a:p>
+            <a:pPr marL="0" indent="0">
+              <a:lnSpc>
+                <a:spcPct val="110000"/>
+              </a:lnSpc>
+              <a:buNone/>
+            </a:pPr>
+            <a:r>
+              <a:rPr lang="pt-PT" b="1" dirty="0" err="1"/>
+              <a:t>Result</a:t>
+            </a:r>
+            <a:r>
+              <a:rPr lang="pt-PT" b="1" dirty="0"/>
+              <a:t>:</a:t>
+            </a:r>
+          </a:p>
+          <a:p>
+            <a:pPr>
+              <a:lnSpc>
+                <a:spcPct val="110000"/>
+              </a:lnSpc>
+            </a:pPr>
+            <a:r>
+              <a:rPr lang="pt-PT" dirty="0" err="1"/>
+              <a:t>Keeps</a:t>
+            </a:r>
+            <a:r>
+              <a:rPr lang="pt-PT" dirty="0"/>
+              <a:t> </a:t>
+            </a:r>
+            <a:r>
+              <a:rPr lang="pt-PT" dirty="0" err="1"/>
+              <a:t>the</a:t>
+            </a:r>
+            <a:r>
+              <a:rPr lang="pt-PT" dirty="0"/>
+              <a:t> </a:t>
+            </a:r>
+            <a:r>
+              <a:rPr lang="pt-PT" dirty="0" err="1"/>
+              <a:t>model</a:t>
+            </a:r>
+            <a:r>
+              <a:rPr lang="pt-PT" dirty="0"/>
+              <a:t> </a:t>
+            </a:r>
+            <a:r>
+              <a:rPr lang="pt-PT" dirty="0" err="1"/>
+              <a:t>aligned</a:t>
+            </a:r>
+            <a:r>
+              <a:rPr lang="pt-PT" dirty="0"/>
+              <a:t> </a:t>
+            </a:r>
+            <a:r>
+              <a:rPr lang="pt-PT" dirty="0" err="1"/>
+              <a:t>and</a:t>
+            </a:r>
+            <a:r>
+              <a:rPr lang="pt-PT" dirty="0"/>
+              <a:t> </a:t>
+            </a:r>
+            <a:r>
+              <a:rPr lang="pt-PT" dirty="0" err="1"/>
+              <a:t>good</a:t>
+            </a:r>
+            <a:r>
+              <a:rPr lang="pt-PT" dirty="0"/>
+              <a:t> </a:t>
+            </a:r>
+            <a:r>
+              <a:rPr lang="pt-PT" dirty="0" err="1"/>
+              <a:t>at</a:t>
+            </a:r>
+            <a:r>
+              <a:rPr lang="pt-PT" dirty="0"/>
+              <a:t> general NLP </a:t>
+            </a:r>
+            <a:r>
+              <a:rPr lang="pt-PT" dirty="0" err="1"/>
+              <a:t>tasks</a:t>
+            </a:r>
+            <a:endParaRPr lang="pt-PT" dirty="0"/>
+          </a:p>
+          <a:p>
+            <a:pPr>
+              <a:lnSpc>
+                <a:spcPct val="110000"/>
+              </a:lnSpc>
+            </a:pPr>
+            <a:r>
+              <a:rPr lang="pt-PT" dirty="0" err="1"/>
+              <a:t>The</a:t>
+            </a:r>
+            <a:r>
+              <a:rPr lang="pt-PT" dirty="0"/>
+              <a:t> </a:t>
+            </a:r>
+            <a:r>
+              <a:rPr lang="pt-PT" dirty="0" err="1"/>
+              <a:t>model</a:t>
+            </a:r>
+            <a:r>
+              <a:rPr lang="pt-PT" dirty="0"/>
+              <a:t> </a:t>
+            </a:r>
+            <a:r>
+              <a:rPr lang="pt-PT" dirty="0" err="1"/>
+              <a:t>stays</a:t>
+            </a:r>
+            <a:r>
+              <a:rPr lang="pt-PT" dirty="0"/>
+              <a:t> </a:t>
+            </a:r>
+            <a:r>
+              <a:rPr lang="pt-PT" dirty="0" err="1"/>
+              <a:t>polite</a:t>
+            </a:r>
+            <a:r>
+              <a:rPr lang="pt-PT" dirty="0"/>
+              <a:t>, </a:t>
+            </a:r>
+            <a:r>
+              <a:rPr lang="pt-PT" dirty="0" err="1"/>
+              <a:t>aligned</a:t>
+            </a:r>
+            <a:r>
+              <a:rPr lang="pt-PT" dirty="0"/>
+              <a:t>, </a:t>
+            </a:r>
+            <a:r>
+              <a:rPr lang="pt-PT" dirty="0" err="1"/>
+              <a:t>and</a:t>
+            </a:r>
+            <a:r>
+              <a:rPr lang="pt-PT" dirty="0"/>
+              <a:t> </a:t>
+            </a:r>
+            <a:r>
+              <a:rPr lang="pt-PT" dirty="0" err="1"/>
+              <a:t>still</a:t>
+            </a:r>
+            <a:r>
+              <a:rPr lang="pt-PT" dirty="0"/>
+              <a:t> </a:t>
+            </a:r>
+            <a:r>
+              <a:rPr lang="pt-PT" dirty="0" err="1"/>
+              <a:t>capable</a:t>
+            </a:r>
+            <a:r>
+              <a:rPr lang="pt-PT" dirty="0"/>
+              <a:t> in </a:t>
+            </a:r>
+            <a:r>
+              <a:rPr lang="pt-PT" dirty="0" err="1"/>
+              <a:t>language</a:t>
+            </a:r>
+            <a:r>
+              <a:rPr lang="pt-PT" dirty="0"/>
+              <a:t> </a:t>
+            </a:r>
+            <a:r>
+              <a:rPr lang="pt-PT"/>
+              <a:t>tasks</a:t>
+            </a:r>
+          </a:p>
+        </p:txBody>
+      </p:sp>
+    </p:spTree>
+    <p:extLst>
+      <p:ext uri="{BB962C8B-B14F-4D97-AF65-F5344CB8AC3E}">
+        <p14:creationId xmlns:p14="http://schemas.microsoft.com/office/powerpoint/2010/main" val="487803876"/>
       </p:ext>
     </p:extLst>
   </p:cSld>

</xml_diff>